<commit_message>
Spiked fiddly bits exemplars from Extrusions
</commit_message>
<xml_diff>
--- a/extrusion-planning/extrusion-planning.pptx
+++ b/extrusion-planning/extrusion-planning.pptx
@@ -9,6 +9,7 @@
   <p:sldIdLst>
     <p:sldId id="256" r:id="rId4"/>
     <p:sldId id="260" r:id="rId5"/>
+    <p:sldId id="261" r:id="rId6"/>
   </p:sldIdLst>
   <p:sldSz cx="12192000" cy="6858000"/>
   <p:notesSz cx="6858000" cy="9144000"/>
@@ -11136,6 +11137,843 @@
       </p:grpSpPr>
       <p:sp>
         <p:nvSpPr>
+          <p:cNvPr id="137" name="Flowchart: Delay 136">
+            <a:extLst>
+              <a:ext uri="{FF2B5EF4-FFF2-40B4-BE49-F238E27FC236}">
+                <a16:creationId xmlns:a16="http://schemas.microsoft.com/office/drawing/2014/main" id="{F625F5F2-E0A7-4904-9657-02A41188C26B}"/>
+              </a:ext>
+            </a:extLst>
+          </p:cNvPr>
+          <p:cNvSpPr/>
+          <p:nvPr/>
+        </p:nvSpPr>
+        <p:spPr>
+          <a:xfrm>
+            <a:off x="2363288" y="535175"/>
+            <a:ext cx="1390106" cy="1633867"/>
+          </a:xfrm>
+          <a:prstGeom prst="flowChartDelay">
+            <a:avLst/>
+          </a:prstGeom>
+          <a:solidFill>
+            <a:srgbClr val="E3BD6A"/>
+          </a:solidFill>
+          <a:ln>
+            <a:noFill/>
+          </a:ln>
+        </p:spPr>
+        <p:style>
+          <a:lnRef idx="2">
+            <a:schemeClr val="accent1">
+              <a:shade val="50000"/>
+            </a:schemeClr>
+          </a:lnRef>
+          <a:fillRef idx="1">
+            <a:schemeClr val="accent1"/>
+          </a:fillRef>
+          <a:effectRef idx="0">
+            <a:schemeClr val="accent1"/>
+          </a:effectRef>
+          <a:fontRef idx="minor">
+            <a:schemeClr val="lt1"/>
+          </a:fontRef>
+        </p:style>
+        <p:txBody>
+          <a:bodyPr rtlCol="0" anchor="ctr"/>
+          <a:lstStyle/>
+          <a:p>
+            <a:pPr algn="ctr"/>
+            <a:endParaRPr lang="en-IE"/>
+          </a:p>
+        </p:txBody>
+      </p:sp>
+      <p:sp>
+        <p:nvSpPr>
+          <p:cNvPr id="138" name="Oval 137">
+            <a:extLst>
+              <a:ext uri="{FF2B5EF4-FFF2-40B4-BE49-F238E27FC236}">
+                <a16:creationId xmlns:a16="http://schemas.microsoft.com/office/drawing/2014/main" id="{598E1538-BA84-42BC-964B-91452CD67B4B}"/>
+              </a:ext>
+            </a:extLst>
+          </p:cNvPr>
+          <p:cNvSpPr/>
+          <p:nvPr/>
+        </p:nvSpPr>
+        <p:spPr>
+          <a:xfrm>
+            <a:off x="2326779" y="499175"/>
+            <a:ext cx="72000" cy="72000"/>
+          </a:xfrm>
+          <a:prstGeom prst="ellipse">
+            <a:avLst/>
+          </a:prstGeom>
+          <a:solidFill>
+            <a:srgbClr val="5A8ACD"/>
+          </a:solidFill>
+          <a:ln>
+            <a:noFill/>
+          </a:ln>
+        </p:spPr>
+        <p:style>
+          <a:lnRef idx="2">
+            <a:schemeClr val="accent1">
+              <a:shade val="50000"/>
+            </a:schemeClr>
+          </a:lnRef>
+          <a:fillRef idx="1">
+            <a:schemeClr val="accent1"/>
+          </a:fillRef>
+          <a:effectRef idx="0">
+            <a:schemeClr val="accent1"/>
+          </a:effectRef>
+          <a:fontRef idx="minor">
+            <a:schemeClr val="lt1"/>
+          </a:fontRef>
+        </p:style>
+        <p:txBody>
+          <a:bodyPr rtlCol="0" anchor="ctr"/>
+          <a:lstStyle/>
+          <a:p>
+            <a:pPr algn="ctr"/>
+            <a:endParaRPr lang="en-IE"/>
+          </a:p>
+        </p:txBody>
+      </p:sp>
+      <p:sp>
+        <p:nvSpPr>
+          <p:cNvPr id="139" name="Oval 138">
+            <a:extLst>
+              <a:ext uri="{FF2B5EF4-FFF2-40B4-BE49-F238E27FC236}">
+                <a16:creationId xmlns:a16="http://schemas.microsoft.com/office/drawing/2014/main" id="{24AF98A5-0545-44D8-B68A-289B624A0E41}"/>
+              </a:ext>
+            </a:extLst>
+          </p:cNvPr>
+          <p:cNvSpPr/>
+          <p:nvPr/>
+        </p:nvSpPr>
+        <p:spPr>
+          <a:xfrm>
+            <a:off x="3004086" y="499175"/>
+            <a:ext cx="72000" cy="72000"/>
+          </a:xfrm>
+          <a:prstGeom prst="ellipse">
+            <a:avLst/>
+          </a:prstGeom>
+          <a:solidFill>
+            <a:srgbClr val="5A8ACD"/>
+          </a:solidFill>
+          <a:ln>
+            <a:noFill/>
+          </a:ln>
+        </p:spPr>
+        <p:style>
+          <a:lnRef idx="2">
+            <a:schemeClr val="accent1">
+              <a:shade val="50000"/>
+            </a:schemeClr>
+          </a:lnRef>
+          <a:fillRef idx="1">
+            <a:schemeClr val="accent1"/>
+          </a:fillRef>
+          <a:effectRef idx="0">
+            <a:schemeClr val="accent1"/>
+          </a:effectRef>
+          <a:fontRef idx="minor">
+            <a:schemeClr val="lt1"/>
+          </a:fontRef>
+        </p:style>
+        <p:txBody>
+          <a:bodyPr rtlCol="0" anchor="ctr"/>
+          <a:lstStyle/>
+          <a:p>
+            <a:pPr algn="ctr"/>
+            <a:endParaRPr lang="en-IE"/>
+          </a:p>
+        </p:txBody>
+      </p:sp>
+      <p:sp>
+        <p:nvSpPr>
+          <p:cNvPr id="141" name="Oval 140">
+            <a:extLst>
+              <a:ext uri="{FF2B5EF4-FFF2-40B4-BE49-F238E27FC236}">
+                <a16:creationId xmlns:a16="http://schemas.microsoft.com/office/drawing/2014/main" id="{CF1D41E2-011D-4F41-8F01-ADF44526088A}"/>
+              </a:ext>
+            </a:extLst>
+          </p:cNvPr>
+          <p:cNvSpPr/>
+          <p:nvPr/>
+        </p:nvSpPr>
+        <p:spPr>
+          <a:xfrm>
+            <a:off x="3551445" y="782606"/>
+            <a:ext cx="72000" cy="72000"/>
+          </a:xfrm>
+          <a:prstGeom prst="ellipse">
+            <a:avLst/>
+          </a:prstGeom>
+          <a:solidFill>
+            <a:srgbClr val="5A8ACD"/>
+          </a:solidFill>
+          <a:ln>
+            <a:noFill/>
+          </a:ln>
+        </p:spPr>
+        <p:style>
+          <a:lnRef idx="2">
+            <a:schemeClr val="accent1">
+              <a:shade val="50000"/>
+            </a:schemeClr>
+          </a:lnRef>
+          <a:fillRef idx="1">
+            <a:schemeClr val="accent1"/>
+          </a:fillRef>
+          <a:effectRef idx="0">
+            <a:schemeClr val="accent1"/>
+          </a:effectRef>
+          <a:fontRef idx="minor">
+            <a:schemeClr val="lt1"/>
+          </a:fontRef>
+        </p:style>
+        <p:txBody>
+          <a:bodyPr rtlCol="0" anchor="ctr"/>
+          <a:lstStyle/>
+          <a:p>
+            <a:pPr algn="ctr"/>
+            <a:endParaRPr lang="en-IE"/>
+          </a:p>
+        </p:txBody>
+      </p:sp>
+      <p:sp>
+        <p:nvSpPr>
+          <p:cNvPr id="143" name="TextBox 142">
+            <a:extLst>
+              <a:ext uri="{FF2B5EF4-FFF2-40B4-BE49-F238E27FC236}">
+                <a16:creationId xmlns:a16="http://schemas.microsoft.com/office/drawing/2014/main" id="{01AD53DF-6C44-472D-9364-34D4388064D8}"/>
+              </a:ext>
+            </a:extLst>
+          </p:cNvPr>
+          <p:cNvSpPr txBox="1"/>
+          <p:nvPr/>
+        </p:nvSpPr>
+        <p:spPr>
+          <a:xfrm>
+            <a:off x="1818238" y="4011"/>
+            <a:ext cx="1089081" cy="307777"/>
+          </a:xfrm>
+          <a:prstGeom prst="rect">
+            <a:avLst/>
+          </a:prstGeom>
+          <a:noFill/>
+        </p:spPr>
+        <p:txBody>
+          <a:bodyPr wrap="square" rtlCol="0">
+            <a:spAutoFit/>
+          </a:bodyPr>
+          <a:lstStyle/>
+          <a:p>
+            <a:r>
+              <a:rPr lang="en-US" sz="1400" dirty="0">
+                <a:solidFill>
+                  <a:srgbClr val="E3BD6A"/>
+                </a:solidFill>
+              </a:rPr>
+              <a:t>(-0.25, 0.5)</a:t>
+            </a:r>
+            <a:endParaRPr lang="en-IE" sz="1400" dirty="0">
+              <a:solidFill>
+                <a:srgbClr val="E3BD6A"/>
+              </a:solidFill>
+            </a:endParaRPr>
+          </a:p>
+        </p:txBody>
+      </p:sp>
+      <p:sp>
+        <p:nvSpPr>
+          <p:cNvPr id="145" name="TextBox 144">
+            <a:extLst>
+              <a:ext uri="{FF2B5EF4-FFF2-40B4-BE49-F238E27FC236}">
+                <a16:creationId xmlns:a16="http://schemas.microsoft.com/office/drawing/2014/main" id="{14F56A99-734B-4A9B-911D-C4869985F25E}"/>
+              </a:ext>
+            </a:extLst>
+          </p:cNvPr>
+          <p:cNvSpPr txBox="1"/>
+          <p:nvPr/>
+        </p:nvSpPr>
+        <p:spPr>
+          <a:xfrm>
+            <a:off x="2569075" y="172793"/>
+            <a:ext cx="1089081" cy="307777"/>
+          </a:xfrm>
+          <a:prstGeom prst="rect">
+            <a:avLst/>
+          </a:prstGeom>
+          <a:noFill/>
+        </p:spPr>
+        <p:txBody>
+          <a:bodyPr wrap="square" rtlCol="0">
+            <a:spAutoFit/>
+          </a:bodyPr>
+          <a:lstStyle/>
+          <a:p>
+            <a:r>
+              <a:rPr lang="en-US" sz="1400" dirty="0">
+                <a:solidFill>
+                  <a:srgbClr val="E3BD6A"/>
+                </a:solidFill>
+              </a:rPr>
+              <a:t>(0.25, 0.5)</a:t>
+            </a:r>
+            <a:endParaRPr lang="en-IE" sz="1400" dirty="0">
+              <a:solidFill>
+                <a:srgbClr val="E3BD6A"/>
+              </a:solidFill>
+            </a:endParaRPr>
+          </a:p>
+        </p:txBody>
+      </p:sp>
+      <p:sp>
+        <p:nvSpPr>
+          <p:cNvPr id="146" name="TextBox 145">
+            <a:extLst>
+              <a:ext uri="{FF2B5EF4-FFF2-40B4-BE49-F238E27FC236}">
+                <a16:creationId xmlns:a16="http://schemas.microsoft.com/office/drawing/2014/main" id="{B41D70D4-1D92-484C-90CE-6C7D0D940F74}"/>
+              </a:ext>
+            </a:extLst>
+          </p:cNvPr>
+          <p:cNvSpPr txBox="1"/>
+          <p:nvPr/>
+        </p:nvSpPr>
+        <p:spPr>
+          <a:xfrm>
+            <a:off x="3681393" y="496668"/>
+            <a:ext cx="1248524" cy="307777"/>
+          </a:xfrm>
+          <a:prstGeom prst="rect">
+            <a:avLst/>
+          </a:prstGeom>
+          <a:noFill/>
+        </p:spPr>
+        <p:txBody>
+          <a:bodyPr wrap="square" rtlCol="0">
+            <a:spAutoFit/>
+          </a:bodyPr>
+          <a:lstStyle/>
+          <a:p>
+            <a:r>
+              <a:rPr lang="en-US" sz="1400" dirty="0">
+                <a:solidFill>
+                  <a:srgbClr val="E3BD6A"/>
+                </a:solidFill>
+              </a:rPr>
+              <a:t>( x = </a:t>
+            </a:r>
+            <a:endParaRPr lang="en-IE" sz="1400" dirty="0">
+              <a:solidFill>
+                <a:srgbClr val="E3BD6A"/>
+              </a:solidFill>
+            </a:endParaRPr>
+          </a:p>
+        </p:txBody>
+      </p:sp>
+      <p:sp>
+        <p:nvSpPr>
+          <p:cNvPr id="147" name="TextBox 146">
+            <a:extLst>
+              <a:ext uri="{FF2B5EF4-FFF2-40B4-BE49-F238E27FC236}">
+                <a16:creationId xmlns:a16="http://schemas.microsoft.com/office/drawing/2014/main" id="{9439C6D8-60C5-495B-B535-407E4EEC4826}"/>
+              </a:ext>
+            </a:extLst>
+          </p:cNvPr>
+          <p:cNvSpPr txBox="1"/>
+          <p:nvPr/>
+        </p:nvSpPr>
+        <p:spPr>
+          <a:xfrm>
+            <a:off x="3687008" y="784205"/>
+            <a:ext cx="1089081" cy="307777"/>
+          </a:xfrm>
+          <a:prstGeom prst="rect">
+            <a:avLst/>
+          </a:prstGeom>
+          <a:noFill/>
+        </p:spPr>
+        <p:txBody>
+          <a:bodyPr wrap="square" rtlCol="0">
+            <a:spAutoFit/>
+          </a:bodyPr>
+          <a:lstStyle/>
+          <a:p>
+            <a:r>
+              <a:rPr lang="en-US" sz="1400" dirty="0">
+                <a:solidFill>
+                  <a:srgbClr val="E3BD6A"/>
+                </a:solidFill>
+              </a:rPr>
+              <a:t>(1.47, -6.47)</a:t>
+            </a:r>
+            <a:endParaRPr lang="en-IE" sz="1400" dirty="0">
+              <a:solidFill>
+                <a:srgbClr val="E3BD6A"/>
+              </a:solidFill>
+            </a:endParaRPr>
+          </a:p>
+        </p:txBody>
+      </p:sp>
+      <p:sp>
+        <p:nvSpPr>
+          <p:cNvPr id="23" name="Oval 22">
+            <a:extLst>
+              <a:ext uri="{FF2B5EF4-FFF2-40B4-BE49-F238E27FC236}">
+                <a16:creationId xmlns:a16="http://schemas.microsoft.com/office/drawing/2014/main" id="{9516DC06-7CE6-47A6-AC17-ACF4274E857C}"/>
+              </a:ext>
+            </a:extLst>
+          </p:cNvPr>
+          <p:cNvSpPr/>
+          <p:nvPr/>
+        </p:nvSpPr>
+        <p:spPr>
+          <a:xfrm>
+            <a:off x="2326779" y="2135549"/>
+            <a:ext cx="72000" cy="72000"/>
+          </a:xfrm>
+          <a:prstGeom prst="ellipse">
+            <a:avLst/>
+          </a:prstGeom>
+          <a:solidFill>
+            <a:srgbClr val="5A8ACD"/>
+          </a:solidFill>
+          <a:ln>
+            <a:noFill/>
+          </a:ln>
+        </p:spPr>
+        <p:style>
+          <a:lnRef idx="2">
+            <a:schemeClr val="accent1">
+              <a:shade val="50000"/>
+            </a:schemeClr>
+          </a:lnRef>
+          <a:fillRef idx="1">
+            <a:schemeClr val="accent1"/>
+          </a:fillRef>
+          <a:effectRef idx="0">
+            <a:schemeClr val="accent1"/>
+          </a:effectRef>
+          <a:fontRef idx="minor">
+            <a:schemeClr val="lt1"/>
+          </a:fontRef>
+        </p:style>
+        <p:txBody>
+          <a:bodyPr rtlCol="0" anchor="ctr"/>
+          <a:lstStyle/>
+          <a:p>
+            <a:pPr algn="ctr"/>
+            <a:endParaRPr lang="en-IE"/>
+          </a:p>
+        </p:txBody>
+      </p:sp>
+      <p:sp>
+        <p:nvSpPr>
+          <p:cNvPr id="24" name="Oval 23">
+            <a:extLst>
+              <a:ext uri="{FF2B5EF4-FFF2-40B4-BE49-F238E27FC236}">
+                <a16:creationId xmlns:a16="http://schemas.microsoft.com/office/drawing/2014/main" id="{0E3F241B-5CA7-4C86-85D5-411FA0C70D25}"/>
+              </a:ext>
+            </a:extLst>
+          </p:cNvPr>
+          <p:cNvSpPr/>
+          <p:nvPr/>
+        </p:nvSpPr>
+        <p:spPr>
+          <a:xfrm>
+            <a:off x="3004086" y="2135549"/>
+            <a:ext cx="72000" cy="72000"/>
+          </a:xfrm>
+          <a:prstGeom prst="ellipse">
+            <a:avLst/>
+          </a:prstGeom>
+          <a:solidFill>
+            <a:srgbClr val="5A8ACD"/>
+          </a:solidFill>
+          <a:ln>
+            <a:noFill/>
+          </a:ln>
+        </p:spPr>
+        <p:style>
+          <a:lnRef idx="2">
+            <a:schemeClr val="accent1">
+              <a:shade val="50000"/>
+            </a:schemeClr>
+          </a:lnRef>
+          <a:fillRef idx="1">
+            <a:schemeClr val="accent1"/>
+          </a:fillRef>
+          <a:effectRef idx="0">
+            <a:schemeClr val="accent1"/>
+          </a:effectRef>
+          <a:fontRef idx="minor">
+            <a:schemeClr val="lt1"/>
+          </a:fontRef>
+        </p:style>
+        <p:txBody>
+          <a:bodyPr rtlCol="0" anchor="ctr"/>
+          <a:lstStyle/>
+          <a:p>
+            <a:pPr algn="ctr"/>
+            <a:endParaRPr lang="en-IE"/>
+          </a:p>
+        </p:txBody>
+      </p:sp>
+      <p:sp>
+        <p:nvSpPr>
+          <p:cNvPr id="25" name="TextBox 24">
+            <a:extLst>
+              <a:ext uri="{FF2B5EF4-FFF2-40B4-BE49-F238E27FC236}">
+                <a16:creationId xmlns:a16="http://schemas.microsoft.com/office/drawing/2014/main" id="{AC231D22-36A9-4118-A525-1B4A9D7A8E56}"/>
+              </a:ext>
+            </a:extLst>
+          </p:cNvPr>
+          <p:cNvSpPr txBox="1"/>
+          <p:nvPr/>
+        </p:nvSpPr>
+        <p:spPr>
+          <a:xfrm>
+            <a:off x="1818238" y="2220540"/>
+            <a:ext cx="1089081" cy="307777"/>
+          </a:xfrm>
+          <a:prstGeom prst="rect">
+            <a:avLst/>
+          </a:prstGeom>
+          <a:noFill/>
+        </p:spPr>
+        <p:txBody>
+          <a:bodyPr wrap="square" rtlCol="0">
+            <a:spAutoFit/>
+          </a:bodyPr>
+          <a:lstStyle/>
+          <a:p>
+            <a:r>
+              <a:rPr lang="en-US" sz="1400" dirty="0">
+                <a:solidFill>
+                  <a:srgbClr val="E3BD6A"/>
+                </a:solidFill>
+              </a:rPr>
+              <a:t>(-0.25, -0.5)</a:t>
+            </a:r>
+            <a:endParaRPr lang="en-IE" sz="1400" dirty="0">
+              <a:solidFill>
+                <a:srgbClr val="E3BD6A"/>
+              </a:solidFill>
+            </a:endParaRPr>
+          </a:p>
+        </p:txBody>
+      </p:sp>
+      <p:sp>
+        <p:nvSpPr>
+          <p:cNvPr id="26" name="TextBox 25">
+            <a:extLst>
+              <a:ext uri="{FF2B5EF4-FFF2-40B4-BE49-F238E27FC236}">
+                <a16:creationId xmlns:a16="http://schemas.microsoft.com/office/drawing/2014/main" id="{6D500BF5-FAF9-4E67-ABED-D788F05957ED}"/>
+              </a:ext>
+            </a:extLst>
+          </p:cNvPr>
+          <p:cNvSpPr txBox="1"/>
+          <p:nvPr/>
+        </p:nvSpPr>
+        <p:spPr>
+          <a:xfrm>
+            <a:off x="2569075" y="2468700"/>
+            <a:ext cx="1089081" cy="307777"/>
+          </a:xfrm>
+          <a:prstGeom prst="rect">
+            <a:avLst/>
+          </a:prstGeom>
+          <a:noFill/>
+        </p:spPr>
+        <p:txBody>
+          <a:bodyPr wrap="square" rtlCol="0">
+            <a:spAutoFit/>
+          </a:bodyPr>
+          <a:lstStyle/>
+          <a:p>
+            <a:r>
+              <a:rPr lang="en-US" sz="1400" dirty="0">
+                <a:solidFill>
+                  <a:srgbClr val="E3BD6A"/>
+                </a:solidFill>
+              </a:rPr>
+              <a:t>(0.25, -0.5)</a:t>
+            </a:r>
+            <a:endParaRPr lang="en-IE" sz="1400" dirty="0">
+              <a:solidFill>
+                <a:srgbClr val="E3BD6A"/>
+              </a:solidFill>
+            </a:endParaRPr>
+          </a:p>
+        </p:txBody>
+      </p:sp>
+      <p:sp>
+        <p:nvSpPr>
+          <p:cNvPr id="27" name="Oval 26">
+            <a:extLst>
+              <a:ext uri="{FF2B5EF4-FFF2-40B4-BE49-F238E27FC236}">
+                <a16:creationId xmlns:a16="http://schemas.microsoft.com/office/drawing/2014/main" id="{8D7E334F-7612-4FA9-A8C1-128839416ED5}"/>
+              </a:ext>
+            </a:extLst>
+          </p:cNvPr>
+          <p:cNvSpPr/>
+          <p:nvPr/>
+        </p:nvSpPr>
+        <p:spPr>
+          <a:xfrm>
+            <a:off x="2707995" y="1310438"/>
+            <a:ext cx="72000" cy="72000"/>
+          </a:xfrm>
+          <a:prstGeom prst="ellipse">
+            <a:avLst/>
+          </a:prstGeom>
+          <a:solidFill>
+            <a:srgbClr val="5A8ACD"/>
+          </a:solidFill>
+          <a:ln>
+            <a:noFill/>
+          </a:ln>
+        </p:spPr>
+        <p:style>
+          <a:lnRef idx="2">
+            <a:schemeClr val="accent1">
+              <a:shade val="50000"/>
+            </a:schemeClr>
+          </a:lnRef>
+          <a:fillRef idx="1">
+            <a:schemeClr val="accent1"/>
+          </a:fillRef>
+          <a:effectRef idx="0">
+            <a:schemeClr val="accent1"/>
+          </a:effectRef>
+          <a:fontRef idx="minor">
+            <a:schemeClr val="lt1"/>
+          </a:fontRef>
+        </p:style>
+        <p:txBody>
+          <a:bodyPr rtlCol="0" anchor="ctr"/>
+          <a:lstStyle/>
+          <a:p>
+            <a:pPr algn="ctr"/>
+            <a:endParaRPr lang="en-IE"/>
+          </a:p>
+        </p:txBody>
+      </p:sp>
+      <p:sp>
+        <p:nvSpPr>
+          <p:cNvPr id="28" name="TextBox 27">
+            <a:extLst>
+              <a:ext uri="{FF2B5EF4-FFF2-40B4-BE49-F238E27FC236}">
+                <a16:creationId xmlns:a16="http://schemas.microsoft.com/office/drawing/2014/main" id="{235F0C87-A293-4337-B26F-60FFE7AB1539}"/>
+              </a:ext>
+            </a:extLst>
+          </p:cNvPr>
+          <p:cNvSpPr txBox="1"/>
+          <p:nvPr/>
+        </p:nvSpPr>
+        <p:spPr>
+          <a:xfrm>
+            <a:off x="2326779" y="1395429"/>
+            <a:ext cx="521297" cy="307777"/>
+          </a:xfrm>
+          <a:prstGeom prst="rect">
+            <a:avLst/>
+          </a:prstGeom>
+          <a:noFill/>
+        </p:spPr>
+        <p:txBody>
+          <a:bodyPr wrap="none" rtlCol="0">
+            <a:spAutoFit/>
+          </a:bodyPr>
+          <a:lstStyle/>
+          <a:p>
+            <a:r>
+              <a:rPr lang="en-US" sz="1400" dirty="0">
+                <a:solidFill>
+                  <a:srgbClr val="5A8ACD"/>
+                </a:solidFill>
+              </a:rPr>
+              <a:t>(0,0)</a:t>
+            </a:r>
+            <a:endParaRPr lang="en-IE" sz="1400" dirty="0">
+              <a:solidFill>
+                <a:srgbClr val="5A8ACD"/>
+              </a:solidFill>
+            </a:endParaRPr>
+          </a:p>
+        </p:txBody>
+      </p:sp>
+      <p:sp>
+        <p:nvSpPr>
+          <p:cNvPr id="29" name="Oval 28">
+            <a:extLst>
+              <a:ext uri="{FF2B5EF4-FFF2-40B4-BE49-F238E27FC236}">
+                <a16:creationId xmlns:a16="http://schemas.microsoft.com/office/drawing/2014/main" id="{5C70474E-9653-4197-9291-04AD51238BE5}"/>
+              </a:ext>
+            </a:extLst>
+          </p:cNvPr>
+          <p:cNvSpPr/>
+          <p:nvPr/>
+        </p:nvSpPr>
+        <p:spPr>
+          <a:xfrm>
+            <a:off x="3004086" y="1304824"/>
+            <a:ext cx="72000" cy="72000"/>
+          </a:xfrm>
+          <a:prstGeom prst="ellipse">
+            <a:avLst/>
+          </a:prstGeom>
+          <a:solidFill>
+            <a:srgbClr val="5A8ACD"/>
+          </a:solidFill>
+          <a:ln>
+            <a:noFill/>
+          </a:ln>
+        </p:spPr>
+        <p:style>
+          <a:lnRef idx="2">
+            <a:schemeClr val="accent1">
+              <a:shade val="50000"/>
+            </a:schemeClr>
+          </a:lnRef>
+          <a:fillRef idx="1">
+            <a:schemeClr val="accent1"/>
+          </a:fillRef>
+          <a:effectRef idx="0">
+            <a:schemeClr val="accent1"/>
+          </a:effectRef>
+          <a:fontRef idx="minor">
+            <a:schemeClr val="lt1"/>
+          </a:fontRef>
+        </p:style>
+        <p:txBody>
+          <a:bodyPr rtlCol="0" anchor="ctr"/>
+          <a:lstStyle/>
+          <a:p>
+            <a:pPr algn="ctr"/>
+            <a:endParaRPr lang="en-IE"/>
+          </a:p>
+        </p:txBody>
+      </p:sp>
+      <p:sp>
+        <p:nvSpPr>
+          <p:cNvPr id="30" name="TextBox 29">
+            <a:extLst>
+              <a:ext uri="{FF2B5EF4-FFF2-40B4-BE49-F238E27FC236}">
+                <a16:creationId xmlns:a16="http://schemas.microsoft.com/office/drawing/2014/main" id="{98E79BC6-9C66-4C4A-BCB7-F522A26F9F46}"/>
+              </a:ext>
+            </a:extLst>
+          </p:cNvPr>
+          <p:cNvSpPr txBox="1"/>
+          <p:nvPr/>
+        </p:nvSpPr>
+        <p:spPr>
+          <a:xfrm>
+            <a:off x="2921184" y="1395429"/>
+            <a:ext cx="748923" cy="307777"/>
+          </a:xfrm>
+          <a:prstGeom prst="rect">
+            <a:avLst/>
+          </a:prstGeom>
+          <a:noFill/>
+        </p:spPr>
+        <p:txBody>
+          <a:bodyPr wrap="none" rtlCol="0">
+            <a:spAutoFit/>
+          </a:bodyPr>
+          <a:lstStyle/>
+          <a:p>
+            <a:r>
+              <a:rPr lang="en-US" sz="1400" dirty="0">
+                <a:solidFill>
+                  <a:srgbClr val="5A8ACD"/>
+                </a:solidFill>
+              </a:rPr>
+              <a:t>(0.25,0)</a:t>
+            </a:r>
+            <a:endParaRPr lang="en-IE" sz="1400" dirty="0">
+              <a:solidFill>
+                <a:srgbClr val="5A8ACD"/>
+              </a:solidFill>
+            </a:endParaRPr>
+          </a:p>
+        </p:txBody>
+      </p:sp>
+      <p:cxnSp>
+        <p:nvCxnSpPr>
+          <p:cNvPr id="5" name="Straight Connector 4">
+            <a:extLst>
+              <a:ext uri="{FF2B5EF4-FFF2-40B4-BE49-F238E27FC236}">
+                <a16:creationId xmlns:a16="http://schemas.microsoft.com/office/drawing/2014/main" id="{5C580846-389C-45BD-A328-D3456840E053}"/>
+              </a:ext>
+            </a:extLst>
+          </p:cNvPr>
+          <p:cNvCxnSpPr>
+            <a:cxnSpLocks/>
+          </p:cNvCxnSpPr>
+          <p:nvPr/>
+        </p:nvCxnSpPr>
+        <p:spPr>
+          <a:xfrm flipH="1">
+            <a:off x="3039291" y="809897"/>
+            <a:ext cx="548641" cy="522514"/>
+          </a:xfrm>
+          <a:prstGeom prst="line">
+            <a:avLst/>
+          </a:prstGeom>
+          <a:ln w="28575"/>
+        </p:spPr>
+        <p:style>
+          <a:lnRef idx="1">
+            <a:schemeClr val="accent1"/>
+          </a:lnRef>
+          <a:fillRef idx="0">
+            <a:schemeClr val="accent1"/>
+          </a:fillRef>
+          <a:effectRef idx="0">
+            <a:schemeClr val="accent1"/>
+          </a:effectRef>
+          <a:fontRef idx="minor">
+            <a:schemeClr val="tx1"/>
+          </a:fontRef>
+        </p:style>
+      </p:cxnSp>
+    </p:spTree>
+    <p:extLst>
+      <p:ext uri="{BB962C8B-B14F-4D97-AF65-F5344CB8AC3E}">
+        <p14:creationId xmlns:p14="http://schemas.microsoft.com/office/powerpoint/2010/main" val="1330587924"/>
+      </p:ext>
+    </p:extLst>
+  </p:cSld>
+  <p:clrMapOvr>
+    <a:masterClrMapping/>
+  </p:clrMapOvr>
+</p:sld>
+</file>
+
+<file path=ppt/slides/slide3.xml><?xml version="1.0" encoding="utf-8"?>
+<p:sld xmlns:a="http://schemas.openxmlformats.org/drawingml/2006/main" xmlns:r="http://schemas.openxmlformats.org/officeDocument/2006/relationships" xmlns:p="http://schemas.openxmlformats.org/presentationml/2006/main">
+  <p:cSld>
+    <p:spTree>
+      <p:nvGrpSpPr>
+        <p:cNvPr id="1" name=""/>
+        <p:cNvGrpSpPr/>
+        <p:nvPr/>
+      </p:nvGrpSpPr>
+      <p:grpSpPr>
+        <a:xfrm>
+          <a:off x="0" y="0"/>
+          <a:ext cx="0" cy="0"/>
+          <a:chOff x="0" y="0"/>
+          <a:chExt cx="0" cy="0"/>
+        </a:xfrm>
+      </p:grpSpPr>
+      <p:sp>
+        <p:nvSpPr>
           <p:cNvPr id="97" name="Rectangle 96">
             <a:extLst>
               <a:ext uri="{FF2B5EF4-FFF2-40B4-BE49-F238E27FC236}">
@@ -12132,7 +12970,7 @@
     </p:spTree>
     <p:extLst>
       <p:ext uri="{BB962C8B-B14F-4D97-AF65-F5344CB8AC3E}">
-        <p14:creationId xmlns:p14="http://schemas.microsoft.com/office/powerpoint/2010/main" val="1330587924"/>
+        <p14:creationId xmlns:p14="http://schemas.microsoft.com/office/powerpoint/2010/main" val="625743238"/>
       </p:ext>
     </p:extLst>
   </p:cSld>

</xml_diff>